<commit_message>
Updated link on last slide
</commit_message>
<xml_diff>
--- a/Slides/Stone USB - Widescreen.pptx
+++ b/Slides/Stone USB - Widescreen.pptx
@@ -5107,7 +5107,7 @@
             <a:pPr marL="0" indent="0" algn="ctr">
               <a:buNone/>
             </a:pPr>
-            <a:endParaRPr lang="en-US" u="sng" dirty="0" smtClean="0">
+            <a:endParaRPr lang="en-US" sz="4000" u="sng" dirty="0" smtClean="0">
               <a:hlinkClick r:id="rId3"/>
             </a:endParaRPr>
           </a:p>
@@ -5116,22 +5116,24 @@
               <a:buNone/>
             </a:pPr>
             <a:r>
-              <a:rPr lang="en-US" sz="4000" u="sng" dirty="0" smtClean="0">
+              <a:rPr lang="en-US" sz="5400" u="sng" dirty="0" smtClean="0">
                 <a:solidFill>
                   <a:schemeClr val="accent4"/>
                 </a:solidFill>
                 <a:hlinkClick r:id="rId3"/>
               </a:rPr>
-              <a:t>https://library.waikato.ac.nz/usb/tict-USB.zip</a:t>
-            </a:r>
-            <a:endParaRPr lang="en-US" sz="4000" u="sng" dirty="0" smtClean="0">
-              <a:solidFill>
-                <a:schemeClr val="accent4"/>
-              </a:solidFill>
-            </a:endParaRPr>
-          </a:p>
-          <a:p>
-            <a:endParaRPr lang="en-US" u="sng" dirty="0" smtClean="0"/>
+              <a:t>https://</a:t>
+            </a:r>
+            <a:r>
+              <a:rPr lang="en-US" sz="5400" u="sng" dirty="0" smtClean="0">
+                <a:solidFill>
+                  <a:schemeClr val="accent4"/>
+                </a:solidFill>
+                <a:hlinkClick r:id="rId3"/>
+              </a:rPr>
+              <a:t>library.waikato.ac.nz/usb</a:t>
+            </a:r>
+            <a:endParaRPr lang="en-US" sz="4000" u="sng" dirty="0" smtClean="0"/>
           </a:p>
           <a:p>
             <a:endParaRPr lang="en-NZ" dirty="0"/>

</xml_diff>